<commit_message>
Added a new label
</commit_message>
<xml_diff>
--- a/Resources/HealthyAlternativesGuide.pptx
+++ b/Resources/HealthyAlternativesGuide.pptx
@@ -264,7 +264,7 @@
           <a:p>
             <a:fld id="{E9BF1F2D-2AEF-4074-BE6D-430396F80950}" type="datetimeFigureOut">
               <a:rPr lang="en-US" smtClean="0"/>
-              <a:t>4/20/2020</a:t>
+              <a:t>4/28/2020</a:t>
             </a:fld>
             <a:endParaRPr lang="en-US"/>
           </a:p>
@@ -434,7 +434,7 @@
           <a:p>
             <a:fld id="{E9BF1F2D-2AEF-4074-BE6D-430396F80950}" type="datetimeFigureOut">
               <a:rPr lang="en-US" smtClean="0"/>
-              <a:t>4/20/2020</a:t>
+              <a:t>4/28/2020</a:t>
             </a:fld>
             <a:endParaRPr lang="en-US"/>
           </a:p>
@@ -614,7 +614,7 @@
           <a:p>
             <a:fld id="{E9BF1F2D-2AEF-4074-BE6D-430396F80950}" type="datetimeFigureOut">
               <a:rPr lang="en-US" smtClean="0"/>
-              <a:t>4/20/2020</a:t>
+              <a:t>4/28/2020</a:t>
             </a:fld>
             <a:endParaRPr lang="en-US"/>
           </a:p>
@@ -784,7 +784,7 @@
           <a:p>
             <a:fld id="{E9BF1F2D-2AEF-4074-BE6D-430396F80950}" type="datetimeFigureOut">
               <a:rPr lang="en-US" smtClean="0"/>
-              <a:t>4/20/2020</a:t>
+              <a:t>4/28/2020</a:t>
             </a:fld>
             <a:endParaRPr lang="en-US"/>
           </a:p>
@@ -1028,7 +1028,7 @@
           <a:p>
             <a:fld id="{E9BF1F2D-2AEF-4074-BE6D-430396F80950}" type="datetimeFigureOut">
               <a:rPr lang="en-US" smtClean="0"/>
-              <a:t>4/20/2020</a:t>
+              <a:t>4/28/2020</a:t>
             </a:fld>
             <a:endParaRPr lang="en-US"/>
           </a:p>
@@ -1260,7 +1260,7 @@
           <a:p>
             <a:fld id="{E9BF1F2D-2AEF-4074-BE6D-430396F80950}" type="datetimeFigureOut">
               <a:rPr lang="en-US" smtClean="0"/>
-              <a:t>4/20/2020</a:t>
+              <a:t>4/28/2020</a:t>
             </a:fld>
             <a:endParaRPr lang="en-US"/>
           </a:p>
@@ -1627,7 +1627,7 @@
           <a:p>
             <a:fld id="{E9BF1F2D-2AEF-4074-BE6D-430396F80950}" type="datetimeFigureOut">
               <a:rPr lang="en-US" smtClean="0"/>
-              <a:t>4/20/2020</a:t>
+              <a:t>4/28/2020</a:t>
             </a:fld>
             <a:endParaRPr lang="en-US"/>
           </a:p>
@@ -1745,7 +1745,7 @@
           <a:p>
             <a:fld id="{E9BF1F2D-2AEF-4074-BE6D-430396F80950}" type="datetimeFigureOut">
               <a:rPr lang="en-US" smtClean="0"/>
-              <a:t>4/20/2020</a:t>
+              <a:t>4/28/2020</a:t>
             </a:fld>
             <a:endParaRPr lang="en-US"/>
           </a:p>
@@ -1840,7 +1840,7 @@
           <a:p>
             <a:fld id="{E9BF1F2D-2AEF-4074-BE6D-430396F80950}" type="datetimeFigureOut">
               <a:rPr lang="en-US" smtClean="0"/>
-              <a:t>4/20/2020</a:t>
+              <a:t>4/28/2020</a:t>
             </a:fld>
             <a:endParaRPr lang="en-US"/>
           </a:p>
@@ -2117,7 +2117,7 @@
           <a:p>
             <a:fld id="{E9BF1F2D-2AEF-4074-BE6D-430396F80950}" type="datetimeFigureOut">
               <a:rPr lang="en-US" smtClean="0"/>
-              <a:t>4/20/2020</a:t>
+              <a:t>4/28/2020</a:t>
             </a:fld>
             <a:endParaRPr lang="en-US"/>
           </a:p>
@@ -2374,7 +2374,7 @@
           <a:p>
             <a:fld id="{E9BF1F2D-2AEF-4074-BE6D-430396F80950}" type="datetimeFigureOut">
               <a:rPr lang="en-US" smtClean="0"/>
-              <a:t>4/20/2020</a:t>
+              <a:t>4/28/2020</a:t>
             </a:fld>
             <a:endParaRPr lang="en-US"/>
           </a:p>
@@ -2587,7 +2587,7 @@
           <a:p>
             <a:fld id="{E9BF1F2D-2AEF-4074-BE6D-430396F80950}" type="datetimeFigureOut">
               <a:rPr lang="en-US" smtClean="0"/>
-              <a:t>4/20/2020</a:t>
+              <a:t>4/28/2020</a:t>
             </a:fld>
             <a:endParaRPr lang="en-US"/>
           </a:p>
@@ -4154,7 +4154,7 @@
       </p:pic>
       <p:pic>
         <p:nvPicPr>
-          <p:cNvPr id="10" name="Picture 9" descr="Chicken breast food tracker showing 65% fat, 23% carbs, and 12% protein">
+          <p:cNvPr id="10" name="Picture 9" descr="Hummus food tracker showing 65% fat, 23% carbs, and 12% protein">
             <a:extLst>
               <a:ext uri="{FF2B5EF4-FFF2-40B4-BE49-F238E27FC236}">
                 <a16:creationId xmlns:a16="http://schemas.microsoft.com/office/drawing/2014/main" id="{86E6EC70-9AEE-4601-BD82-EBC9F1ADC3DD}"/>

</xml_diff>